<commit_message>
loadscreen funkar toppen WOHO!!
</commit_message>
<xml_diff>
--- a/Procedurell_Generering_Prototyp.pptx
+++ b/Procedurell_Generering_Prototyp.pptx
@@ -657,7 +657,15 @@
           <a:p>
             <a:r>
               <a:rPr lang="sv-SE" dirty="0"/>
-              <a:t>Den nya, transformerade, grafen är brädet som uppstår efter att kandidater har tagits bort av </a:t>
+              <a:t>Den nya, transformerade, grafen är brädet som uppstår efter att kandidater har tagits bort </a:t>
+            </a:r>
+            <a:r>
+              <a:rPr lang="sv-SE" dirty="0" err="1"/>
+              <a:t>m.h.a</a:t>
+            </a:r>
+            <a:r>
+              <a:rPr lang="sv-SE" dirty="0"/>
+              <a:t>. </a:t>
             </a:r>
             <a:r>
               <a:rPr lang="sv-SE" dirty="0" err="1"/>
@@ -826,7 +834,7 @@
             </a:r>
             <a:r>
               <a:rPr lang="sv-SE" dirty="0" err="1"/>
-              <a:t>HumanlySolveable</a:t>
+              <a:t>HumanlySolvable</a:t>
             </a:r>
             <a:r>
               <a:rPr lang="sv-SE" dirty="0"/>
@@ -888,7 +896,7 @@
             </a:r>
             <a:r>
               <a:rPr lang="sv-SE" dirty="0"/>
-              <a:t>. Om inte det går så kan alltså inte brädet lösas logiskt med mänskliga strategier, åtminstone inte med de strategier som </a:t>
+              <a:t>. Om inte det går så kan alltså inte brädet lösas logiskt med mänskliga strategier, åtminstone inte med de strategier som den </a:t>
             </a:r>
             <a:r>
               <a:rPr lang="sv-SE" dirty="0" err="1"/>
@@ -896,7 +904,16 @@
             </a:r>
             <a:r>
               <a:rPr lang="sv-SE" dirty="0"/>
-              <a:t> känner till. Svårighetsgraden som använder anger avgör vilka strategier som kan användas.</a:t>
+              <a:t> känner till. </a:t>
+            </a:r>
+          </a:p>
+          <a:p>
+            <a:endParaRPr lang="sv-SE" dirty="0"/>
+          </a:p>
+          <a:p>
+            <a:r>
+              <a:rPr lang="sv-SE" dirty="0"/>
+              <a:t>Den valda svårighetsgraden avgör vilka strategier som kan användas.</a:t>
             </a:r>
           </a:p>
           <a:p>
@@ -1093,7 +1110,7 @@
             </a:r>
             <a:r>
               <a:rPr lang="sv-SE" i="0" dirty="0"/>
-              <a:t> WFC. Den har även en inbyggd lösnings-AI som säkerställer att en människa kan lösa det sudoku som kan genereras. Den </a:t>
+              <a:t> WFC. Den har även en inbyggd lösnings-AI som säkerställer att en människa kan lösa det sudoku som skapats. Den </a:t>
             </a:r>
             <a:r>
               <a:rPr lang="sv-SE" i="0" dirty="0" err="1"/>
@@ -1301,30 +1318,6 @@
               <a:t>.</a:t>
             </a:r>
           </a:p>
-          <a:p>
-            <a:endParaRPr lang="sv-SE" i="1" dirty="0"/>
-          </a:p>
-          <a:p>
-            <a:endParaRPr lang="sv-SE" i="1" dirty="0"/>
-          </a:p>
-          <a:p>
-            <a:r>
-              <a:rPr lang="sv-SE" i="1" dirty="0"/>
-              <a:t>Kommentar: demonstration. Visa spelupplevelsen med hjälp av en videoinspelning. Redogör för upplevelsens start- och slutpunkt. Kommentera videoinspelningen muntligt med tydlig koppling till den valda AI-teknologin.</a:t>
-            </a:r>
-          </a:p>
-          <a:p>
-            <a:endParaRPr lang="sv-SE" i="1" dirty="0"/>
-          </a:p>
-          <a:p>
-            <a:r>
-              <a:rPr lang="sv-SE" i="1" dirty="0"/>
-              <a:t>Kommentar. Infoga några bra skärmbilder från spelet som visar centrala delar av spelupplevelsen.</a:t>
-            </a:r>
-          </a:p>
-          <a:p>
-            <a:endParaRPr lang="sv-SE" dirty="0"/>
-          </a:p>
         </p:txBody>
       </p:sp>
       <p:sp>
@@ -1442,15 +1435,7 @@
           <a:p>
             <a:r>
               <a:rPr lang="sv-SE" dirty="0"/>
-              <a:t>När </a:t>
-            </a:r>
-            <a:r>
-              <a:rPr lang="sv-SE" dirty="0" err="1"/>
-              <a:t>envågfunktion</a:t>
-            </a:r>
-            <a:r>
-              <a:rPr lang="sv-SE" dirty="0"/>
-              <a:t> kollapsar så kommer andra vågfunktionen påverkas av kollapsen: informationen propagerar.</a:t>
+              <a:t>När en vågfunktion kollapsar så kommer andra vågfunktioner att påverkas av kollapsen: man säger att informationen propagerar.</a:t>
             </a:r>
           </a:p>
           <a:p>
@@ -1468,15 +1453,15 @@
           <a:p>
             <a:r>
               <a:rPr lang="sv-SE" dirty="0"/>
-              <a:t>De regler som reducerar en vågfunktion kan vara väldigt komplicerade. Men för ett sudoku är det väldigt trivialt om man ska jämföra med exempelvis ett 3D-grid </a:t>
-            </a:r>
-            <a:r>
-              <a:rPr lang="sv-SE" dirty="0" err="1"/>
-              <a:t>tile-systmem</a:t>
-            </a:r>
-            <a:r>
-              <a:rPr lang="sv-SE" dirty="0"/>
-              <a:t>.</a:t>
+              <a:t>De regler som reducerar en vågfunktion kan vara väldigt komplexa. Men för ett sudoku är det väldigt trivialt om man ska jämföra med exempelvis ett 3D-grid </a:t>
+            </a:r>
+            <a:r>
+              <a:rPr lang="sv-SE" dirty="0" err="1"/>
+              <a:t>tile</a:t>
+            </a:r>
+            <a:r>
+              <a:rPr lang="sv-SE" dirty="0"/>
+              <a:t>-system.</a:t>
             </a:r>
           </a:p>
           <a:p>
@@ -1566,7 +1551,7 @@
           <a:p>
             <a:r>
               <a:rPr lang="sv-SE" dirty="0"/>
-              <a:t>I ett Sudoku måste varje rad, kolumn och 3x3 box innehålla sifforna 1-9. I ett tomt bräde kan varje cell fortfarande vara vilken siffra som helst mellan 1-9. Alla celler har alltså 9 kandidater, dvs entropi 9. Genom att lägga exempelvis en 5:a i rutan enligt mittenbilden så kan ingen flera femma vara i de celler som femman interagerar med, dvs de celler i samma rad, kolumn och box. Kollapsen propagerar informationen till de cellerna som tappar kandidaten 5 från deras superposition, och de har nu en entropi på 8. </a:t>
+              <a:t>I ett Sudoku måste varje rad, kolumn och 3x3 box innehålla sifforna 1-9. I ett tomt bräde kan varje cell fortfarande vara vilken siffra som helst. Alla celler har alltså 9 kandidater, dvs entropi 9. Genom att lägga exempelvis en 5:a i rutan enligt mittenbilden så kan ingen till femma finnas i de celler som femman interagerar med, dvs de celler i samma rad, kolumn och box. Kollapsen propagerar informationen till de cellerna som tappar kandidaten 5 från deras superposition, och de har nu en entropi på 8. </a:t>
             </a:r>
           </a:p>
           <a:p>
@@ -1575,7 +1560,16 @@
           <a:p>
             <a:r>
               <a:rPr lang="sv-SE" dirty="0"/>
-              <a:t>Lite förenklat så består min algoritm av tre steg. Så länge brädet inte är ifyllt:</a:t>
+              <a:t>Lite förenklat så består min algoritm av tre steg. </a:t>
+            </a:r>
+          </a:p>
+          <a:p>
+            <a:endParaRPr lang="sv-SE" dirty="0"/>
+          </a:p>
+          <a:p>
+            <a:r>
+              <a:rPr lang="sv-SE" dirty="0"/>
+              <a:t>Så länge brädet inte är ifyllt:</a:t>
             </a:r>
           </a:p>
           <a:p>
@@ -1584,7 +1578,7 @@
             </a:pPr>
             <a:r>
               <a:rPr lang="sv-SE" dirty="0"/>
-              <a:t>Hitta cell med lägst entropi</a:t>
+              <a:t>Så hittar man den cell med lägst entropi (om flera finns så väljs en på måfå).</a:t>
             </a:r>
           </a:p>
           <a:p>
@@ -1593,7 +1587,7 @@
             </a:pPr>
             <a:r>
               <a:rPr lang="sv-SE" dirty="0"/>
-              <a:t>Kollapsa den cellen till dess lägsta möjliga kandidat</a:t>
+              <a:t>Man kollapsar den cellen till dess lägsta möjliga kandidat</a:t>
             </a:r>
           </a:p>
           <a:p>
@@ -1602,40 +1596,7 @@
             </a:pPr>
             <a:r>
               <a:rPr lang="sv-SE" dirty="0"/>
-              <a:t>Propagera den informationen till alla </a:t>
-            </a:r>
-            <a:r>
-              <a:rPr lang="sv-SE" dirty="0" err="1"/>
-              <a:t>tiles</a:t>
-            </a:r>
-            <a:r>
-              <a:rPr lang="sv-SE" dirty="0"/>
-              <a:t> som interagerar med den.</a:t>
-            </a:r>
-          </a:p>
-          <a:p>
-            <a:endParaRPr lang="sv-SE" dirty="0"/>
-          </a:p>
-          <a:p>
-            <a:r>
-              <a:rPr lang="sv-SE" dirty="0"/>
-              <a:t>I min algoritm så väljer man alltid den cell som har lägst entropi. Om det finns flera celler med samma entropi så väljs en på måfå, som exempelvis vid starten då alla har entropi 9. Man kollapsar sedan den cellen till dess lägsta möjliga </a:t>
-            </a:r>
-            <a:r>
-              <a:rPr lang="sv-SE" dirty="0" err="1"/>
-              <a:t>kandidate</a:t>
-            </a:r>
-            <a:r>
-              <a:rPr lang="sv-SE" dirty="0"/>
-              <a:t> och </a:t>
-            </a:r>
-            <a:r>
-              <a:rPr lang="sv-SE" dirty="0" err="1"/>
-              <a:t>progagerar</a:t>
-            </a:r>
-            <a:r>
-              <a:rPr lang="sv-SE" dirty="0"/>
-              <a:t> den informationen vidare.</a:t>
+              <a:t>Och till sist så propagerar man den informationen till alla celler som den interagerar med.</a:t>
             </a:r>
           </a:p>
           <a:p>
@@ -1742,7 +1703,7 @@
           <a:p>
             <a:r>
               <a:rPr lang="sv-SE" dirty="0"/>
-              <a:t>När man väl har fyllt brädet så måste man såklart ta bort ett antal siffror därifrån, annars skulle det inte vara ett pussel.</a:t>
+              <a:t>När man väl har fyllt brädet så måste man såklart ta bort ett antal siffror, annars skulle det inte vara ett pussel.</a:t>
             </a:r>
           </a:p>
           <a:p>
@@ -1759,7 +1720,7 @@
             </a:r>
             <a:r>
               <a:rPr lang="sv-SE" dirty="0"/>
-              <a:t> i brädet, igen med ordningen lägst entropi först, och anger att det indexet är besökt.</a:t>
+              <a:t> i brädet, igen med ordningen lägst entropi först</a:t>
             </a:r>
           </a:p>
           <a:p>
@@ -1767,8 +1728,46 @@
           </a:p>
           <a:p>
             <a:r>
-              <a:rPr lang="sv-SE" dirty="0"/>
-              <a:t>Sen tar jag bort den </a:t>
+              <a:rPr lang="sv-SE" dirty="0" err="1"/>
+              <a:t>Tilen</a:t>
+            </a:r>
+            <a:r>
+              <a:rPr lang="sv-SE" dirty="0"/>
+              <a:t> med lägst entropi tar jag bort från brädet.</a:t>
+            </a:r>
+          </a:p>
+          <a:p>
+            <a:endParaRPr lang="sv-SE" dirty="0"/>
+          </a:p>
+          <a:p>
+            <a:r>
+              <a:rPr lang="sv-SE" dirty="0"/>
+              <a:t>Men nu måste två grejer kollas:</a:t>
+            </a:r>
+          </a:p>
+          <a:p>
+            <a:endParaRPr lang="sv-SE" dirty="0"/>
+          </a:p>
+          <a:p>
+            <a:r>
+              <a:rPr lang="sv-SE" dirty="0"/>
+              <a:t>Den första är att brädet fortfarande bara har en lösning, annars är det inte ett giltigt sudoku. Med en modifierad version av min </a:t>
+            </a:r>
+            <a:r>
+              <a:rPr lang="sv-SE" dirty="0" err="1"/>
+              <a:t>backtracking</a:t>
+            </a:r>
+            <a:r>
+              <a:rPr lang="sv-SE" dirty="0"/>
+              <a:t>-algoritm så kan man hitta alla lösningar med </a:t>
+            </a:r>
+            <a:r>
+              <a:rPr lang="sv-SE" dirty="0" err="1"/>
+              <a:t>brute</a:t>
+            </a:r>
+            <a:r>
+              <a:rPr lang="sv-SE" dirty="0"/>
+              <a:t> force. Om antalet är större än ett så är brädet inte giltigt längre, och </a:t>
             </a:r>
             <a:r>
               <a:rPr lang="sv-SE" dirty="0" err="1"/>
@@ -1776,7 +1775,7 @@
             </a:r>
             <a:r>
               <a:rPr lang="sv-SE" dirty="0"/>
-              <a:t> från brädet.</a:t>
+              <a:t> måste därför vara kvar.</a:t>
             </a:r>
           </a:p>
           <a:p>
@@ -1785,7 +1784,15 @@
           <a:p>
             <a:r>
               <a:rPr lang="sv-SE" dirty="0"/>
-              <a:t>Men nu måste två grejer kollas:</a:t>
+              <a:t>Den andra grejen som man måste kolla är om en människa fortfarande kan lösa brädet. Visst, en människa kan ju alltid lösa ett bräde genom att själv använda </a:t>
+            </a:r>
+            <a:r>
+              <a:rPr lang="sv-SE" dirty="0" err="1"/>
+              <a:t>brute</a:t>
+            </a:r>
+            <a:r>
+              <a:rPr lang="sv-SE" dirty="0"/>
+              <a:t> force, men det är inte alls tillfredsställande att göra. Istället vill man lösa brädet med hjälp av logiska strategier.</a:t>
             </a:r>
           </a:p>
           <a:p>
@@ -1794,49 +1801,7 @@
           <a:p>
             <a:r>
               <a:rPr lang="sv-SE" dirty="0"/>
-              <a:t>Den första är att brädet fortfarande bara har en lösning, annars är det inte ett giltigt sudoku. Med en modifierad version av min </a:t>
-            </a:r>
-            <a:r>
-              <a:rPr lang="sv-SE" dirty="0" err="1"/>
-              <a:t>backtracking</a:t>
-            </a:r>
-            <a:r>
-              <a:rPr lang="sv-SE" dirty="0"/>
-              <a:t>-algoritm så kan man räkna antal lösningar genom </a:t>
-            </a:r>
-            <a:r>
-              <a:rPr lang="sv-SE" dirty="0" err="1"/>
-              <a:t>brute</a:t>
-            </a:r>
-            <a:r>
-              <a:rPr lang="sv-SE" dirty="0"/>
-              <a:t> force.</a:t>
-            </a:r>
-          </a:p>
-          <a:p>
-            <a:endParaRPr lang="sv-SE" dirty="0"/>
-          </a:p>
-          <a:p>
-            <a:r>
-              <a:rPr lang="sv-SE" dirty="0"/>
-              <a:t>Den andra grejen som man måste kolla är om en människa fortfarande kan lösa bräde. Visst, en människa kan ju alltid lösa ett bräde genom att själv använda </a:t>
-            </a:r>
-            <a:r>
-              <a:rPr lang="sv-SE" dirty="0" err="1"/>
-              <a:t>brute</a:t>
-            </a:r>
-            <a:r>
-              <a:rPr lang="sv-SE" dirty="0"/>
-              <a:t> force, men det är inte alls tillfredsställande att göra. Istället vill man lösa brädet med hjälp av logiska strategier.</a:t>
-            </a:r>
-          </a:p>
-          <a:p>
-            <a:endParaRPr lang="sv-SE" dirty="0"/>
-          </a:p>
-          <a:p>
-            <a:r>
-              <a:rPr lang="sv-SE" dirty="0"/>
-              <a:t>Så då blir frågan, hur tusan kan man veta om ett sudoku kan lösas med mänskliga strategier??</a:t>
+              <a:t>Så då blir frågan, hur kan man veta om ett sudoku kan lösas med mänskliga strategier??</a:t>
             </a:r>
           </a:p>
         </p:txBody>
@@ -1932,7 +1897,7 @@
             </a:pPr>
             <a:r>
               <a:rPr lang="sv-SE" dirty="0"/>
-              <a:t>Är </a:t>
+              <a:t>Den först är </a:t>
             </a:r>
             <a:r>
               <a:rPr lang="sv-SE" dirty="0" err="1"/>
@@ -2066,7 +2031,7 @@
           <a:p>
             <a:r>
               <a:rPr lang="sv-SE" dirty="0"/>
-              <a:t>Här är ett exempel på den enklaste möjliga </a:t>
+              <a:t>Här är ett exempel en </a:t>
             </a:r>
             <a:r>
               <a:rPr lang="sv-SE" dirty="0" err="1"/>
@@ -2082,7 +2047,7 @@
             </a:r>
             <a:r>
               <a:rPr lang="sv-SE" dirty="0"/>
-              <a:t>. Man skannar igen brädet och letar efter en ruta med enbart en kandidat. Den kandidaten måste såklart vara vad som finns i rutan. Denna metod kallas ”</a:t>
+              <a:t>. Man skannar igenom brädet och letar efter en ruta med enbart en kandidat. Den kandidaten måste såklart vara den siffra som ska placeras i rutan. Denna metod kallas ”</a:t>
             </a:r>
             <a:r>
               <a:rPr lang="sv-SE" dirty="0" err="1"/>
@@ -7077,7 +7042,7 @@
             </a:pPr>
             <a:r>
               <a:rPr lang="sv-SE" dirty="0"/>
-              <a:t>I regel: komplicerade</a:t>
+              <a:t>I regel: komplexa</a:t>
             </a:r>
           </a:p>
           <a:p>
@@ -8543,7 +8508,7 @@
             </a:pPr>
             <a:r>
               <a:rPr lang="sv-SE" dirty="0"/>
-              <a:t>Man kan logiskt resonera vars en kandidat kan tas bort, men inte direkt placera någon siffra i brädet</a:t>
+              <a:t>Man kan logiskt resonera vars en kandidat kan tas bort (men inte direkt placera någon siffra i brädet)</a:t>
             </a:r>
           </a:p>
           <a:p>

</xml_diff>